<commit_message>
automation of directory finding for extra data files in functions after instlling package
</commit_message>
<xml_diff>
--- a/data/user_guide.pptx
+++ b/data/user_guide.pptx
@@ -287,7 +287,7 @@
           <a:p>
             <a:fld id="{4C1A78F5-D185-42C3-AAC1-F6948ADA3E13}" type="datetimeFigureOut">
               <a:rPr lang="en-CA" smtClean="0"/>
-              <a:t>2024-05-21</a:t>
+              <a:t>2024-05-23</a:t>
             </a:fld>
             <a:endParaRPr lang="en-CA"/>
           </a:p>
@@ -487,7 +487,7 @@
           <a:p>
             <a:fld id="{4C1A78F5-D185-42C3-AAC1-F6948ADA3E13}" type="datetimeFigureOut">
               <a:rPr lang="en-CA" smtClean="0"/>
-              <a:t>2024-05-21</a:t>
+              <a:t>2024-05-23</a:t>
             </a:fld>
             <a:endParaRPr lang="en-CA"/>
           </a:p>
@@ -697,7 +697,7 @@
           <a:p>
             <a:fld id="{4C1A78F5-D185-42C3-AAC1-F6948ADA3E13}" type="datetimeFigureOut">
               <a:rPr lang="en-CA" smtClean="0"/>
-              <a:t>2024-05-21</a:t>
+              <a:t>2024-05-23</a:t>
             </a:fld>
             <a:endParaRPr lang="en-CA"/>
           </a:p>
@@ -897,7 +897,7 @@
           <a:p>
             <a:fld id="{4C1A78F5-D185-42C3-AAC1-F6948ADA3E13}" type="datetimeFigureOut">
               <a:rPr lang="en-CA" smtClean="0"/>
-              <a:t>2024-05-21</a:t>
+              <a:t>2024-05-23</a:t>
             </a:fld>
             <a:endParaRPr lang="en-CA"/>
           </a:p>
@@ -1173,7 +1173,7 @@
           <a:p>
             <a:fld id="{4C1A78F5-D185-42C3-AAC1-F6948ADA3E13}" type="datetimeFigureOut">
               <a:rPr lang="en-CA" smtClean="0"/>
-              <a:t>2024-05-21</a:t>
+              <a:t>2024-05-23</a:t>
             </a:fld>
             <a:endParaRPr lang="en-CA"/>
           </a:p>
@@ -1441,7 +1441,7 @@
           <a:p>
             <a:fld id="{4C1A78F5-D185-42C3-AAC1-F6948ADA3E13}" type="datetimeFigureOut">
               <a:rPr lang="en-CA" smtClean="0"/>
-              <a:t>2024-05-21</a:t>
+              <a:t>2024-05-23</a:t>
             </a:fld>
             <a:endParaRPr lang="en-CA"/>
           </a:p>
@@ -1856,7 +1856,7 @@
           <a:p>
             <a:fld id="{4C1A78F5-D185-42C3-AAC1-F6948ADA3E13}" type="datetimeFigureOut">
               <a:rPr lang="en-CA" smtClean="0"/>
-              <a:t>2024-05-21</a:t>
+              <a:t>2024-05-23</a:t>
             </a:fld>
             <a:endParaRPr lang="en-CA"/>
           </a:p>
@@ -1998,7 +1998,7 @@
           <a:p>
             <a:fld id="{4C1A78F5-D185-42C3-AAC1-F6948ADA3E13}" type="datetimeFigureOut">
               <a:rPr lang="en-CA" smtClean="0"/>
-              <a:t>2024-05-21</a:t>
+              <a:t>2024-05-23</a:t>
             </a:fld>
             <a:endParaRPr lang="en-CA"/>
           </a:p>
@@ -2111,7 +2111,7 @@
           <a:p>
             <a:fld id="{4C1A78F5-D185-42C3-AAC1-F6948ADA3E13}" type="datetimeFigureOut">
               <a:rPr lang="en-CA" smtClean="0"/>
-              <a:t>2024-05-21</a:t>
+              <a:t>2024-05-23</a:t>
             </a:fld>
             <a:endParaRPr lang="en-CA"/>
           </a:p>
@@ -2424,7 +2424,7 @@
           <a:p>
             <a:fld id="{4C1A78F5-D185-42C3-AAC1-F6948ADA3E13}" type="datetimeFigureOut">
               <a:rPr lang="en-CA" smtClean="0"/>
-              <a:t>2024-05-21</a:t>
+              <a:t>2024-05-23</a:t>
             </a:fld>
             <a:endParaRPr lang="en-CA"/>
           </a:p>
@@ -2713,7 +2713,7 @@
           <a:p>
             <a:fld id="{4C1A78F5-D185-42C3-AAC1-F6948ADA3E13}" type="datetimeFigureOut">
               <a:rPr lang="en-CA" smtClean="0"/>
-              <a:t>2024-05-21</a:t>
+              <a:t>2024-05-23</a:t>
             </a:fld>
             <a:endParaRPr lang="en-CA"/>
           </a:p>
@@ -2956,7 +2956,7 @@
           <a:p>
             <a:fld id="{4C1A78F5-D185-42C3-AAC1-F6948ADA3E13}" type="datetimeFigureOut">
               <a:rPr lang="en-CA" smtClean="0"/>
-              <a:t>2024-05-21</a:t>
+              <a:t>2024-05-23</a:t>
             </a:fld>
             <a:endParaRPr lang="en-CA"/>
           </a:p>
@@ -6604,6 +6604,11 @@
             </a:pPr>
             <a:r>
               <a:rPr lang="en-US" sz="1800" kern="100" dirty="0" err="1">
+                <a:solidFill>
+                  <a:schemeClr val="accent5">
+                    <a:lumMod val="75000"/>
+                  </a:schemeClr>
+                </a:solidFill>
                 <a:effectLst/>
                 <a:latin typeface="Calibri" panose="020F0502020204030204" pitchFamily="34" charset="0"/>
                 <a:ea typeface="Calibri" panose="020F0502020204030204" pitchFamily="34" charset="0"/>
@@ -6613,6 +6618,11 @@
             </a:r>
             <a:r>
               <a:rPr lang="en-US" sz="1800" kern="100" dirty="0">
+                <a:solidFill>
+                  <a:schemeClr val="accent5">
+                    <a:lumMod val="75000"/>
+                  </a:schemeClr>
+                </a:solidFill>
                 <a:effectLst/>
                 <a:latin typeface="Calibri" panose="020F0502020204030204" pitchFamily="34" charset="0"/>
                 <a:ea typeface="Calibri" panose="020F0502020204030204" pitchFamily="34" charset="0"/>
@@ -6622,6 +6632,11 @@
             </a:r>
             <a:r>
               <a:rPr lang="en-US" sz="1800" kern="100" dirty="0" err="1">
+                <a:solidFill>
+                  <a:schemeClr val="accent5">
+                    <a:lumMod val="75000"/>
+                  </a:schemeClr>
+                </a:solidFill>
                 <a:effectLst/>
                 <a:latin typeface="Calibri" panose="020F0502020204030204" pitchFamily="34" charset="0"/>
                 <a:ea typeface="Calibri" panose="020F0502020204030204" pitchFamily="34" charset="0"/>
@@ -6631,6 +6646,11 @@
             </a:r>
             <a:r>
               <a:rPr lang="en-US" sz="1800" kern="100" dirty="0">
+                <a:solidFill>
+                  <a:schemeClr val="accent5">
+                    <a:lumMod val="75000"/>
+                  </a:schemeClr>
+                </a:solidFill>
                 <a:effectLst/>
                 <a:latin typeface="Calibri" panose="020F0502020204030204" pitchFamily="34" charset="0"/>
                 <a:ea typeface="Calibri" panose="020F0502020204030204" pitchFamily="34" charset="0"/>
@@ -6639,6 +6659,11 @@
               <a:t>”)</a:t>
             </a:r>
             <a:endParaRPr lang="en-CA" sz="1800" kern="100" dirty="0">
+              <a:solidFill>
+                <a:schemeClr val="accent5">
+                  <a:lumMod val="75000"/>
+                </a:schemeClr>
+              </a:solidFill>
               <a:effectLst/>
               <a:latin typeface="Calibri" panose="020F0502020204030204" pitchFamily="34" charset="0"/>
               <a:ea typeface="Calibri" panose="020F0502020204030204" pitchFamily="34" charset="0"/>
@@ -6659,6 +6684,11 @@
             </a:pPr>
             <a:r>
               <a:rPr lang="en-US" sz="1800" kern="100" dirty="0" err="1">
+                <a:solidFill>
+                  <a:schemeClr val="accent5">
+                    <a:lumMod val="75000"/>
+                  </a:schemeClr>
+                </a:solidFill>
                 <a:effectLst/>
                 <a:latin typeface="Calibri" panose="020F0502020204030204" pitchFamily="34" charset="0"/>
                 <a:ea typeface="Calibri" panose="020F0502020204030204" pitchFamily="34" charset="0"/>
@@ -6668,6 +6698,11 @@
             </a:r>
             <a:r>
               <a:rPr lang="en-US" sz="1800" kern="100" dirty="0">
+                <a:solidFill>
+                  <a:schemeClr val="accent5">
+                    <a:lumMod val="75000"/>
+                  </a:schemeClr>
+                </a:solidFill>
                 <a:effectLst/>
                 <a:latin typeface="Calibri" panose="020F0502020204030204" pitchFamily="34" charset="0"/>
                 <a:ea typeface="Calibri" panose="020F0502020204030204" pitchFamily="34" charset="0"/>
@@ -6677,6 +6712,11 @@
             </a:r>
             <a:r>
               <a:rPr lang="en-US" sz="1800" kern="100" dirty="0" err="1">
+                <a:solidFill>
+                  <a:schemeClr val="accent5">
+                    <a:lumMod val="75000"/>
+                  </a:schemeClr>
+                </a:solidFill>
                 <a:effectLst/>
                 <a:latin typeface="Calibri" panose="020F0502020204030204" pitchFamily="34" charset="0"/>
                 <a:ea typeface="Calibri" panose="020F0502020204030204" pitchFamily="34" charset="0"/>
@@ -6686,6 +6726,11 @@
             </a:r>
             <a:r>
               <a:rPr lang="en-US" sz="1800" kern="100" dirty="0">
+                <a:solidFill>
+                  <a:schemeClr val="accent5">
+                    <a:lumMod val="75000"/>
+                  </a:schemeClr>
+                </a:solidFill>
                 <a:effectLst/>
                 <a:latin typeface="Calibri" panose="020F0502020204030204" pitchFamily="34" charset="0"/>
                 <a:ea typeface="Calibri" panose="020F0502020204030204" pitchFamily="34" charset="0"/>
@@ -6695,6 +6740,11 @@
             </a:r>
             <a:r>
               <a:rPr lang="en-US" sz="1800" kern="100" dirty="0" err="1">
+                <a:solidFill>
+                  <a:schemeClr val="accent5">
+                    <a:lumMod val="75000"/>
+                  </a:schemeClr>
+                </a:solidFill>
                 <a:effectLst/>
                 <a:latin typeface="Calibri" panose="020F0502020204030204" pitchFamily="34" charset="0"/>
                 <a:ea typeface="Calibri" panose="020F0502020204030204" pitchFamily="34" charset="0"/>
@@ -6704,6 +6754,11 @@
             </a:r>
             <a:r>
               <a:rPr lang="en-US" sz="1800" kern="100" dirty="0">
+                <a:solidFill>
+                  <a:schemeClr val="accent5">
+                    <a:lumMod val="75000"/>
+                  </a:schemeClr>
+                </a:solidFill>
                 <a:effectLst/>
                 <a:latin typeface="Calibri" panose="020F0502020204030204" pitchFamily="34" charset="0"/>
                 <a:ea typeface="Calibri" panose="020F0502020204030204" pitchFamily="34" charset="0"/>
@@ -6711,11 +6766,82 @@
               </a:rPr>
               <a:t>/LobTag2”)</a:t>
             </a:r>
-            <a:endParaRPr lang="en-CA" sz="1800" kern="100" dirty="0">
-              <a:effectLst/>
-              <a:latin typeface="Calibri" panose="020F0502020204030204" pitchFamily="34" charset="0"/>
-              <a:ea typeface="Calibri" panose="020F0502020204030204" pitchFamily="34" charset="0"/>
-              <a:cs typeface="Times New Roman" panose="02020603050405020304" pitchFamily="18" charset="0"/>
+            <a:endParaRPr lang="en-CA" dirty="0">
+              <a:solidFill>
+                <a:schemeClr val="accent5">
+                  <a:lumMod val="75000"/>
+                </a:schemeClr>
+              </a:solidFill>
+            </a:endParaRPr>
+          </a:p>
+          <a:p>
+            <a:pPr marL="0" indent="0">
+              <a:buNone/>
+            </a:pPr>
+            <a:r>
+              <a:rPr lang="en-CA" dirty="0"/>
+              <a:t>After installation:</a:t>
+            </a:r>
+          </a:p>
+          <a:p>
+            <a:pPr marL="0" indent="0">
+              <a:buNone/>
+            </a:pPr>
+            <a:r>
+              <a:rPr lang="en-US" dirty="0"/>
+              <a:t>The location of your template csv files for data entry is found with:</a:t>
+            </a:r>
+          </a:p>
+          <a:p>
+            <a:pPr marL="0" indent="0">
+              <a:buNone/>
+            </a:pPr>
+            <a:r>
+              <a:rPr lang="en-US" dirty="0" err="1">
+                <a:solidFill>
+                  <a:schemeClr val="accent5">
+                    <a:lumMod val="75000"/>
+                  </a:schemeClr>
+                </a:solidFill>
+              </a:rPr>
+              <a:t>system.file</a:t>
+            </a:r>
+            <a:r>
+              <a:rPr lang="en-US" dirty="0">
+                <a:solidFill>
+                  <a:schemeClr val="accent5">
+                    <a:lumMod val="75000"/>
+                  </a:schemeClr>
+                </a:solidFill>
+              </a:rPr>
+              <a:t>("</a:t>
+            </a:r>
+            <a:r>
+              <a:rPr lang="en-US" dirty="0" err="1">
+                <a:solidFill>
+                  <a:schemeClr val="accent5">
+                    <a:lumMod val="75000"/>
+                  </a:schemeClr>
+                </a:solidFill>
+              </a:rPr>
+              <a:t>extdata</a:t>
+            </a:r>
+            <a:r>
+              <a:rPr lang="en-US" dirty="0">
+                <a:solidFill>
+                  <a:schemeClr val="accent5">
+                    <a:lumMod val="75000"/>
+                  </a:schemeClr>
+                </a:solidFill>
+              </a:rPr>
+              <a:t>", package = "LobTag2")</a:t>
+            </a:r>
+            <a:endParaRPr lang="en-CA" dirty="0">
+              <a:solidFill>
+                <a:schemeClr val="accent5">
+                  <a:lumMod val="75000"/>
+                </a:schemeClr>
+              </a:solidFill>
             </a:endParaRPr>
           </a:p>
           <a:p>
@@ -8269,7 +8395,7 @@
 
 <file path=ppt/tags/tag1.xml><?xml version="1.0" encoding="utf-8"?>
 <p:tagLst xmlns:a="http://schemas.openxmlformats.org/drawingml/2006/main" xmlns:r="http://schemas.openxmlformats.org/officeDocument/2006/relationships" xmlns:p="http://schemas.openxmlformats.org/presentationml/2006/main">
-  <p:tag name="ENGAGE" val="{&quot;SavedSwatch&quot;:&quot;-14272694|-12223080|-16154294|-9539986|-16777216|Fisheries and Oceans Canada&quot;,&quot;Id&quot;:&quot;664cfecc45454349a4896ab2&quot;,&quot;SmartGridHorizontal&quot;:0,&quot;LinkedExcelSources&quot;:{},&quot;LinkedProjectSources&quot;:{},&quot;FlowConfig&quot;:{&quot;Canvas&quot;:{&quot;Slide&quot;:-1,&quot;Width&quot;:0,&quot;Height&quot;:0},&quot;Timeline&quot;:{&quot;Actions&quot;:[]}},&quot;LinkedSlideMergeSources&quot;:{},&quot;LinkedSharePointSlideMergeSources&quot;:{}}"/>
+  <p:tag name="ENGAGE" val="{&quot;SavedSwatch&quot;:&quot;-14272694|-12223080|-16154294|-9539986|-16777216|Fisheries and Oceans Canada&quot;,&quot;Id&quot;:&quot;664eb6e44545433a184f68b9&quot;,&quot;SmartGridHorizontal&quot;:0,&quot;LinkedExcelSources&quot;:{},&quot;LinkedProjectSources&quot;:{},&quot;FlowConfig&quot;:{&quot;Canvas&quot;:{&quot;Slide&quot;:-1,&quot;Width&quot;:0,&quot;Height&quot;:0},&quot;Timeline&quot;:{&quot;Actions&quot;:[]}},&quot;LinkedSlideMergeSources&quot;:{},&quot;LinkedSharePointSlideMergeSources&quot;:{}}"/>
 </p:tagLst>
 </file>
 

</xml_diff>

<commit_message>
typo fixed, user guide updated
</commit_message>
<xml_diff>
--- a/data/user_guide.pptx
+++ b/data/user_guide.pptx
@@ -4184,7 +4184,7 @@
             </a:r>
             <a:r>
               <a:rPr lang="en-US" dirty="0"/>
-              <a:t>and selected a data file, the function will perform some general error checking. If there are crucial errors found in the mandatory columns, a dialogue box will appear alerting the user to the location of errors and instructing them to fix these before attempting the upload again. If there are no errors, the user will receive a dialogue alerting them that the upload has completed without errors. This means that the Oracle table LBT_RELEASES has been created and now contains the release data.</a:t>
+              <a:t>and selected a data file, the function will perform some general error checking. If there are crucial errors found in the mandatory columns, a dialogue box will appear alerting the user to the location of errors and instructing them to fix these before attempting the upload again. If there are no errors, the user will receive a dialogue alerting them that the upload has completed without errors. This means that the database table LBT_RELEASES has been created and now contains the release data.</a:t>
             </a:r>
             <a:endParaRPr lang="en-CA" dirty="0"/>
           </a:p>
@@ -4480,7 +4480,7 @@
             </a:pPr>
             <a:r>
               <a:rPr lang="en-US" dirty="0"/>
-              <a:t>Generally, once tags are released, recapture reports will then come in individually over time. For public programs, these data may be highly variable in format and quality. Running he function </a:t>
+              <a:t>Generally, once tags are released, recapture reports will then come in individually over time. For public programs, these data may be highly variable in format and quality. Running the function </a:t>
             </a:r>
             <a:r>
               <a:rPr lang="en-US" dirty="0" err="1">
@@ -4504,7 +4504,7 @@
             </a:r>
             <a:r>
               <a:rPr lang="en-US" dirty="0"/>
-              <a:t>provides the user with a GUI which standardizes the entry of these data into the database. Mandatory fields are highlighted.</a:t>
+              <a:t>provides the user with a data entry window which standardizes the entry of these data into the database. Mandatory fields are highlighted in blue.</a:t>
             </a:r>
             <a:endParaRPr lang="en-US" dirty="0">
               <a:solidFill>
@@ -4544,8 +4544,8 @@
         </p:blipFill>
         <p:spPr>
           <a:xfrm>
-            <a:off x="3330428" y="3507232"/>
-            <a:ext cx="3513523" cy="3107487"/>
+            <a:off x="5911091" y="3507232"/>
+            <a:ext cx="3690109" cy="3263666"/>
           </a:xfrm>
           <a:prstGeom prst="rect">
             <a:avLst/>
@@ -5747,15 +5747,7 @@
             </a:r>
             <a:r>
               <a:rPr lang="en-US" dirty="0"/>
-              <a:t>= ” (</a:t>
-            </a:r>
-            <a:r>
-              <a:rPr lang="en-US" dirty="0" err="1"/>
-              <a:t>Defualt</a:t>
-            </a:r>
-            <a:r>
-              <a:rPr lang="en-US" dirty="0"/>
-              <a:t> = FALSE), if changed to TRUE, maps for every person who has reported recaptures will be generated.</a:t>
+              <a:t>= ” (Default = FALSE), if changed to TRUE, maps for every person who has reported recaptures will be generated.</a:t>
             </a:r>
           </a:p>
           <a:p>
@@ -6848,7 +6840,19 @@
             <a:pPr marL="0" indent="0">
               <a:buNone/>
             </a:pPr>
-            <a:endParaRPr lang="en-CA" dirty="0"/>
+            <a:r>
+              <a:rPr lang="en-CA" dirty="0"/>
+              <a:t>To begin using the package, load the package using:</a:t>
+            </a:r>
+          </a:p>
+          <a:p>
+            <a:pPr marL="0" indent="0">
+              <a:buNone/>
+            </a:pPr>
+            <a:r>
+              <a:rPr lang="en-CA" dirty="0"/>
+              <a:t>Library(</a:t>
+            </a:r>
           </a:p>
         </p:txBody>
       </p:sp>
@@ -8395,7 +8399,7 @@
 
 <file path=ppt/tags/tag1.xml><?xml version="1.0" encoding="utf-8"?>
 <p:tagLst xmlns:a="http://schemas.openxmlformats.org/drawingml/2006/main" xmlns:r="http://schemas.openxmlformats.org/officeDocument/2006/relationships" xmlns:p="http://schemas.openxmlformats.org/presentationml/2006/main">
-  <p:tag name="ENGAGE" val="{&quot;SavedSwatch&quot;:&quot;-14272694|-12223080|-16154294|-9539986|-16777216|Fisheries and Oceans Canada&quot;,&quot;Id&quot;:&quot;664eb6e44545433a184f68b9&quot;,&quot;SmartGridHorizontal&quot;:0,&quot;LinkedExcelSources&quot;:{},&quot;LinkedProjectSources&quot;:{},&quot;FlowConfig&quot;:{&quot;Canvas&quot;:{&quot;Slide&quot;:-1,&quot;Width&quot;:0,&quot;Height&quot;:0},&quot;Timeline&quot;:{&quot;Actions&quot;:[]}},&quot;LinkedSlideMergeSources&quot;:{},&quot;LinkedSharePointSlideMergeSources&quot;:{}}"/>
+  <p:tag name="ENGAGE" val="{&quot;SavedSwatch&quot;:&quot;-14272694|-12223080|-16154294|-9539986|-16777216|Fisheries and Oceans Canada&quot;,&quot;Id&quot;:&quot;664f562e4545434a4472c210&quot;,&quot;SmartGridHorizontal&quot;:0,&quot;LinkedExcelSources&quot;:{},&quot;LinkedProjectSources&quot;:{},&quot;FlowConfig&quot;:{&quot;Canvas&quot;:{&quot;Slide&quot;:-1,&quot;Width&quot;:0,&quot;Height&quot;:0},&quot;Timeline&quot;:{&quot;Actions&quot;:[]}},&quot;LinkedSlideMergeSources&quot;:{},&quot;LinkedSharePointSlideMergeSources&quot;:{}}"/>
 </p:tagLst>
 </file>
 

</xml_diff>

<commit_message>
demo meeting, bug fixing
</commit_message>
<xml_diff>
--- a/data/user_guide.pptx
+++ b/data/user_guide.pptx
@@ -287,7 +287,7 @@
           <a:p>
             <a:fld id="{4C1A78F5-D185-42C3-AAC1-F6948ADA3E13}" type="datetimeFigureOut">
               <a:rPr lang="en-CA" smtClean="0"/>
-              <a:t>2024-05-23</a:t>
+              <a:t>2024-05-24</a:t>
             </a:fld>
             <a:endParaRPr lang="en-CA"/>
           </a:p>
@@ -487,7 +487,7 @@
           <a:p>
             <a:fld id="{4C1A78F5-D185-42C3-AAC1-F6948ADA3E13}" type="datetimeFigureOut">
               <a:rPr lang="en-CA" smtClean="0"/>
-              <a:t>2024-05-23</a:t>
+              <a:t>2024-05-24</a:t>
             </a:fld>
             <a:endParaRPr lang="en-CA"/>
           </a:p>
@@ -697,7 +697,7 @@
           <a:p>
             <a:fld id="{4C1A78F5-D185-42C3-AAC1-F6948ADA3E13}" type="datetimeFigureOut">
               <a:rPr lang="en-CA" smtClean="0"/>
-              <a:t>2024-05-23</a:t>
+              <a:t>2024-05-24</a:t>
             </a:fld>
             <a:endParaRPr lang="en-CA"/>
           </a:p>
@@ -897,7 +897,7 @@
           <a:p>
             <a:fld id="{4C1A78F5-D185-42C3-AAC1-F6948ADA3E13}" type="datetimeFigureOut">
               <a:rPr lang="en-CA" smtClean="0"/>
-              <a:t>2024-05-23</a:t>
+              <a:t>2024-05-24</a:t>
             </a:fld>
             <a:endParaRPr lang="en-CA"/>
           </a:p>
@@ -1173,7 +1173,7 @@
           <a:p>
             <a:fld id="{4C1A78F5-D185-42C3-AAC1-F6948ADA3E13}" type="datetimeFigureOut">
               <a:rPr lang="en-CA" smtClean="0"/>
-              <a:t>2024-05-23</a:t>
+              <a:t>2024-05-24</a:t>
             </a:fld>
             <a:endParaRPr lang="en-CA"/>
           </a:p>
@@ -1441,7 +1441,7 @@
           <a:p>
             <a:fld id="{4C1A78F5-D185-42C3-AAC1-F6948ADA3E13}" type="datetimeFigureOut">
               <a:rPr lang="en-CA" smtClean="0"/>
-              <a:t>2024-05-23</a:t>
+              <a:t>2024-05-24</a:t>
             </a:fld>
             <a:endParaRPr lang="en-CA"/>
           </a:p>
@@ -1856,7 +1856,7 @@
           <a:p>
             <a:fld id="{4C1A78F5-D185-42C3-AAC1-F6948ADA3E13}" type="datetimeFigureOut">
               <a:rPr lang="en-CA" smtClean="0"/>
-              <a:t>2024-05-23</a:t>
+              <a:t>2024-05-24</a:t>
             </a:fld>
             <a:endParaRPr lang="en-CA"/>
           </a:p>
@@ -1998,7 +1998,7 @@
           <a:p>
             <a:fld id="{4C1A78F5-D185-42C3-AAC1-F6948ADA3E13}" type="datetimeFigureOut">
               <a:rPr lang="en-CA" smtClean="0"/>
-              <a:t>2024-05-23</a:t>
+              <a:t>2024-05-24</a:t>
             </a:fld>
             <a:endParaRPr lang="en-CA"/>
           </a:p>
@@ -2111,7 +2111,7 @@
           <a:p>
             <a:fld id="{4C1A78F5-D185-42C3-AAC1-F6948ADA3E13}" type="datetimeFigureOut">
               <a:rPr lang="en-CA" smtClean="0"/>
-              <a:t>2024-05-23</a:t>
+              <a:t>2024-05-24</a:t>
             </a:fld>
             <a:endParaRPr lang="en-CA"/>
           </a:p>
@@ -2424,7 +2424,7 @@
           <a:p>
             <a:fld id="{4C1A78F5-D185-42C3-AAC1-F6948ADA3E13}" type="datetimeFigureOut">
               <a:rPr lang="en-CA" smtClean="0"/>
-              <a:t>2024-05-23</a:t>
+              <a:t>2024-05-24</a:t>
             </a:fld>
             <a:endParaRPr lang="en-CA"/>
           </a:p>
@@ -2713,7 +2713,7 @@
           <a:p>
             <a:fld id="{4C1A78F5-D185-42C3-AAC1-F6948ADA3E13}" type="datetimeFigureOut">
               <a:rPr lang="en-CA" smtClean="0"/>
-              <a:t>2024-05-23</a:t>
+              <a:t>2024-05-24</a:t>
             </a:fld>
             <a:endParaRPr lang="en-CA"/>
           </a:p>
@@ -2956,7 +2956,7 @@
           <a:p>
             <a:fld id="{4C1A78F5-D185-42C3-AAC1-F6948ADA3E13}" type="datetimeFigureOut">
               <a:rPr lang="en-CA" smtClean="0"/>
-              <a:t>2024-05-23</a:t>
+              <a:t>2024-05-24</a:t>
             </a:fld>
             <a:endParaRPr lang="en-CA"/>
           </a:p>
@@ -6215,9 +6215,16 @@
             <p:ph idx="1"/>
           </p:nvPr>
         </p:nvSpPr>
-        <p:spPr/>
-        <p:txBody>
-          <a:bodyPr/>
+        <p:spPr>
+          <a:xfrm>
+            <a:off x="838200" y="1665204"/>
+            <a:ext cx="10515600" cy="4351338"/>
+          </a:xfrm>
+        </p:spPr>
+        <p:txBody>
+          <a:bodyPr>
+            <a:normAutofit lnSpcReduction="10000"/>
+          </a:bodyPr>
           <a:lstStyle/>
           <a:p>
             <a:pPr marL="0" indent="0">
@@ -6225,15 +6232,24 @@
             </a:pPr>
             <a:r>
               <a:rPr lang="en-US" dirty="0"/>
-              <a:t>The following required files are installed with the package and are stored in the local git repository in the </a:t>
+              <a:t>The following required files are installed with the package and are stored in the user’s R library in the “data” and “</a:t>
             </a:r>
             <a:r>
               <a:rPr lang="en-US" dirty="0" err="1"/>
-              <a:t>app.files</a:t>
+              <a:t>extdata</a:t>
             </a:r>
             <a:r>
               <a:rPr lang="en-US" dirty="0"/>
-              <a:t> folder:</a:t>
+              <a:t>” folders:</a:t>
+            </a:r>
+          </a:p>
+          <a:p>
+            <a:pPr marL="0" indent="0">
+              <a:buNone/>
+            </a:pPr>
+            <a:r>
+              <a:rPr lang="en-US" b="1" dirty="0"/>
+              <a:t>data:</a:t>
             </a:r>
           </a:p>
           <a:p>
@@ -6251,6 +6267,26 @@
           </a:p>
           <a:p>
             <a:r>
+              <a:rPr lang="en-US" dirty="0" err="1"/>
+              <a:t>user_guide</a:t>
+            </a:r>
+            <a:endParaRPr lang="en-US" dirty="0"/>
+          </a:p>
+          <a:p>
+            <a:pPr marL="0" indent="0">
+              <a:buNone/>
+            </a:pPr>
+            <a:r>
+              <a:rPr lang="en-US" b="1" dirty="0" err="1"/>
+              <a:t>extdata</a:t>
+            </a:r>
+            <a:r>
+              <a:rPr lang="en-US" b="1" dirty="0"/>
+              <a:t>:</a:t>
+            </a:r>
+          </a:p>
+          <a:p>
+            <a:r>
               <a:rPr lang="en-US" dirty="0"/>
               <a:t>releases_template.csv</a:t>
             </a:r>
@@ -6260,13 +6296,6 @@
               <a:rPr lang="en-US" dirty="0"/>
               <a:t>recaptures_template.csv</a:t>
             </a:r>
-          </a:p>
-          <a:p>
-            <a:r>
-              <a:rPr lang="en-US" dirty="0" err="1"/>
-              <a:t>user_guide</a:t>
-            </a:r>
-            <a:endParaRPr lang="en-US" dirty="0"/>
           </a:p>
         </p:txBody>
       </p:sp>
@@ -8399,7 +8428,7 @@
 
 <file path=ppt/tags/tag1.xml><?xml version="1.0" encoding="utf-8"?>
 <p:tagLst xmlns:a="http://schemas.openxmlformats.org/drawingml/2006/main" xmlns:r="http://schemas.openxmlformats.org/officeDocument/2006/relationships" xmlns:p="http://schemas.openxmlformats.org/presentationml/2006/main">
-  <p:tag name="ENGAGE" val="{&quot;SavedSwatch&quot;:&quot;-14272694|-12223080|-16154294|-9539986|-16777216|Fisheries and Oceans Canada&quot;,&quot;Id&quot;:&quot;664f562e4545434a4472c210&quot;,&quot;SmartGridHorizontal&quot;:0,&quot;LinkedExcelSources&quot;:{},&quot;LinkedProjectSources&quot;:{},&quot;FlowConfig&quot;:{&quot;Canvas&quot;:{&quot;Slide&quot;:-1,&quot;Width&quot;:0,&quot;Height&quot;:0},&quot;Timeline&quot;:{&quot;Actions&quot;:[]}},&quot;LinkedSlideMergeSources&quot;:{},&quot;LinkedSharePointSlideMergeSources&quot;:{}}"/>
+  <p:tag name="ENGAGE" val="{&quot;SavedSwatch&quot;:&quot;-14272694|-12223080|-16154294|-9539986|-16777216|Fisheries and Oceans Canada&quot;,&quot;Id&quot;:&quot;66508f424545431ab86a7f3a&quot;,&quot;SmartGridHorizontal&quot;:0,&quot;LinkedExcelSources&quot;:{},&quot;LinkedProjectSources&quot;:{},&quot;FlowConfig&quot;:{&quot;Canvas&quot;:{&quot;Slide&quot;:-1,&quot;Width&quot;:0,&quot;Height&quot;:0},&quot;Timeline&quot;:{&quot;Actions&quot;:[]}},&quot;LinkedSlideMergeSources&quot;:{},&quot;LinkedSharePointSlideMergeSources&quot;:{}}"/>
 </p:tagLst>
 </file>
 

</xml_diff>